<commit_message>
fixed error in slide - parameters.xml to parameters.json
</commit_message>
<xml_diff>
--- a/ARM Yourself for Effective Azure Provisioning.pptx
+++ b/ARM Yourself for Effective Azure Provisioning.pptx
@@ -255,7 +255,7 @@
           <a:p>
             <a:fld id="{DDC772EA-99BB-47AB-9AD2-E623201CD098}" type="datetimeFigureOut">
               <a:rPr lang="en-GB" smtClean="0"/>
-              <a:t>20/09/2017</a:t>
+              <a:t>24/11/2017</a:t>
             </a:fld>
             <a:endParaRPr lang="en-GB"/>
           </a:p>
@@ -13223,13 +13223,13 @@
   <p:clrMapOvr>
     <a:masterClrMapping/>
   </p:clrMapOvr>
-  <mc:AlternateContent xmlns:mc="http://schemas.openxmlformats.org/markup-compatibility/2006">
-    <mc:Choice xmlns:p14="http://schemas.microsoft.com/office/powerpoint/2010/main" Requires="p14">
+  <mc:AlternateContent xmlns:mc="http://schemas.openxmlformats.org/markup-compatibility/2006" xmlns:p14="http://schemas.microsoft.com/office/powerpoint/2010/main">
+    <mc:Choice Requires="p14">
       <p:transition spd="med" p14:dur="700">
         <p:fade/>
       </p:transition>
     </mc:Choice>
-    <mc:Fallback>
+    <mc:Fallback xmlns="">
       <p:transition spd="med">
         <p:fade/>
       </p:transition>
@@ -13894,13 +13894,13 @@
   <p:clrMapOvr>
     <a:masterClrMapping/>
   </p:clrMapOvr>
-  <mc:AlternateContent xmlns:mc="http://schemas.openxmlformats.org/markup-compatibility/2006">
-    <mc:Choice xmlns:p14="http://schemas.microsoft.com/office/powerpoint/2010/main" Requires="p14">
+  <mc:AlternateContent xmlns:mc="http://schemas.openxmlformats.org/markup-compatibility/2006" xmlns:p14="http://schemas.microsoft.com/office/powerpoint/2010/main">
+    <mc:Choice Requires="p14">
       <p:transition spd="med" p14:dur="700">
         <p:fade/>
       </p:transition>
     </mc:Choice>
-    <mc:Fallback>
+    <mc:Fallback xmlns="">
       <p:transition spd="med">
         <p:fade/>
       </p:transition>
@@ -14027,13 +14027,13 @@
   <p:clrMapOvr>
     <a:masterClrMapping/>
   </p:clrMapOvr>
-  <mc:AlternateContent xmlns:mc="http://schemas.openxmlformats.org/markup-compatibility/2006">
-    <mc:Choice xmlns:p14="http://schemas.microsoft.com/office/powerpoint/2010/main" Requires="p14">
+  <mc:AlternateContent xmlns:mc="http://schemas.openxmlformats.org/markup-compatibility/2006" xmlns:p14="http://schemas.microsoft.com/office/powerpoint/2010/main">
+    <mc:Choice Requires="p14">
       <p:transition spd="med" p14:dur="700">
         <p:fade/>
       </p:transition>
     </mc:Choice>
-    <mc:Fallback>
+    <mc:Fallback xmlns="">
       <p:transition spd="med">
         <p:fade/>
       </p:transition>
@@ -14694,13 +14694,13 @@
   <p:clrMapOvr>
     <a:masterClrMapping/>
   </p:clrMapOvr>
-  <mc:AlternateContent xmlns:mc="http://schemas.openxmlformats.org/markup-compatibility/2006">
-    <mc:Choice xmlns:p14="http://schemas.microsoft.com/office/powerpoint/2010/main" Requires="p14">
+  <mc:AlternateContent xmlns:mc="http://schemas.openxmlformats.org/markup-compatibility/2006" xmlns:p14="http://schemas.microsoft.com/office/powerpoint/2010/main">
+    <mc:Choice Requires="p14">
       <p:transition spd="med" p14:dur="700">
         <p:fade/>
       </p:transition>
     </mc:Choice>
-    <mc:Fallback>
+    <mc:Fallback xmlns="">
       <p:transition spd="med">
         <p:fade/>
       </p:transition>
@@ -14804,13 +14804,13 @@
   <p:clrMapOvr>
     <a:masterClrMapping/>
   </p:clrMapOvr>
-  <mc:AlternateContent xmlns:mc="http://schemas.openxmlformats.org/markup-compatibility/2006">
-    <mc:Choice xmlns:p14="http://schemas.microsoft.com/office/powerpoint/2010/main" Requires="p14">
+  <mc:AlternateContent xmlns:mc="http://schemas.openxmlformats.org/markup-compatibility/2006" xmlns:p14="http://schemas.microsoft.com/office/powerpoint/2010/main">
+    <mc:Choice Requires="p14">
       <p:transition spd="med" p14:dur="700">
         <p:fade/>
       </p:transition>
     </mc:Choice>
-    <mc:Fallback>
+    <mc:Fallback xmlns="">
       <p:transition spd="med">
         <p:fade/>
       </p:transition>
@@ -15514,13 +15514,13 @@
   <p:clrMapOvr>
     <a:masterClrMapping/>
   </p:clrMapOvr>
-  <mc:AlternateContent xmlns:mc="http://schemas.openxmlformats.org/markup-compatibility/2006">
-    <mc:Choice xmlns:p14="http://schemas.microsoft.com/office/powerpoint/2010/main" Requires="p14">
+  <mc:AlternateContent xmlns:mc="http://schemas.openxmlformats.org/markup-compatibility/2006" xmlns:p14="http://schemas.microsoft.com/office/powerpoint/2010/main">
+    <mc:Choice Requires="p14">
       <p:transition spd="med" p14:dur="700">
         <p:fade/>
       </p:transition>
     </mc:Choice>
-    <mc:Fallback>
+    <mc:Fallback xmlns="">
       <p:transition spd="med">
         <p:fade/>
       </p:transition>
@@ -15597,7 +15597,15 @@
           <a:p>
             <a:r>
               <a:rPr lang="en-GB" dirty="0"/>
-              <a:t>Avoid parameters.xml in code repo</a:t>
+              <a:t>Avoid </a:t>
+            </a:r>
+            <a:r>
+              <a:rPr lang="en-GB" dirty="0" err="1"/>
+              <a:t>parameters.json</a:t>
+            </a:r>
+            <a:r>
+              <a:rPr lang="en-GB" dirty="0"/>
+              <a:t> in code repo</a:t>
             </a:r>
           </a:p>
           <a:p>
@@ -15630,13 +15638,13 @@
   <p:clrMapOvr>
     <a:masterClrMapping/>
   </p:clrMapOvr>
-  <mc:AlternateContent xmlns:mc="http://schemas.openxmlformats.org/markup-compatibility/2006">
-    <mc:Choice xmlns:p14="http://schemas.microsoft.com/office/powerpoint/2010/main" Requires="p14">
+  <mc:AlternateContent xmlns:mc="http://schemas.openxmlformats.org/markup-compatibility/2006" xmlns:p14="http://schemas.microsoft.com/office/powerpoint/2010/main">
+    <mc:Choice Requires="p14">
       <p:transition spd="med" p14:dur="700">
         <p:fade/>
       </p:transition>
     </mc:Choice>
-    <mc:Fallback>
+    <mc:Fallback xmlns="">
       <p:transition spd="med">
         <p:fade/>
       </p:transition>
@@ -16432,13 +16440,13 @@
   <p:clrMapOvr>
     <a:masterClrMapping/>
   </p:clrMapOvr>
-  <mc:AlternateContent xmlns:mc="http://schemas.openxmlformats.org/markup-compatibility/2006">
-    <mc:Choice xmlns:p14="http://schemas.microsoft.com/office/powerpoint/2010/main" Requires="p14">
+  <mc:AlternateContent xmlns:mc="http://schemas.openxmlformats.org/markup-compatibility/2006" xmlns:p14="http://schemas.microsoft.com/office/powerpoint/2010/main">
+    <mc:Choice Requires="p14">
       <p:transition spd="med" p14:dur="700">
         <p:fade/>
       </p:transition>
     </mc:Choice>
-    <mc:Fallback>
+    <mc:Fallback xmlns="">
       <p:transition spd="med">
         <p:fade/>
       </p:transition>
@@ -16474,13 +16482,13 @@
   <p:clrMapOvr>
     <a:masterClrMapping/>
   </p:clrMapOvr>
-  <mc:AlternateContent xmlns:mc="http://schemas.openxmlformats.org/markup-compatibility/2006">
-    <mc:Choice xmlns:p14="http://schemas.microsoft.com/office/powerpoint/2010/main" Requires="p14">
+  <mc:AlternateContent xmlns:mc="http://schemas.openxmlformats.org/markup-compatibility/2006" xmlns:p14="http://schemas.microsoft.com/office/powerpoint/2010/main">
+    <mc:Choice Requires="p14">
       <p:transition spd="med" p14:dur="700">
         <p:fade/>
       </p:transition>
     </mc:Choice>
-    <mc:Fallback>
+    <mc:Fallback xmlns="">
       <p:transition spd="med">
         <p:fade/>
       </p:transition>
@@ -17434,13 +17442,13 @@
   <p:clrMapOvr>
     <a:overrideClrMapping bg1="lt1" tx1="dk1" bg2="lt2" tx2="dk2" accent1="accent1" accent2="accent2" accent3="accent3" accent4="accent4" accent5="accent5" accent6="accent6" hlink="hlink" folHlink="folHlink"/>
   </p:clrMapOvr>
-  <mc:AlternateContent xmlns:mc="http://schemas.openxmlformats.org/markup-compatibility/2006">
-    <mc:Choice xmlns:p14="http://schemas.microsoft.com/office/powerpoint/2010/main" Requires="p14">
+  <mc:AlternateContent xmlns:mc="http://schemas.openxmlformats.org/markup-compatibility/2006" xmlns:p14="http://schemas.microsoft.com/office/powerpoint/2010/main">
+    <mc:Choice Requires="p14">
       <p:transition spd="med" p14:dur="700">
         <p:fade/>
       </p:transition>
     </mc:Choice>
-    <mc:Fallback>
+    <mc:Fallback xmlns="">
       <p:transition spd="med">
         <p:fade/>
       </p:transition>
@@ -17583,13 +17591,13 @@
   <p:clrMapOvr>
     <a:masterClrMapping/>
   </p:clrMapOvr>
-  <mc:AlternateContent xmlns:mc="http://schemas.openxmlformats.org/markup-compatibility/2006">
-    <mc:Choice xmlns:p14="http://schemas.microsoft.com/office/powerpoint/2010/main" Requires="p14">
+  <mc:AlternateContent xmlns:mc="http://schemas.openxmlformats.org/markup-compatibility/2006" xmlns:p14="http://schemas.microsoft.com/office/powerpoint/2010/main">
+    <mc:Choice Requires="p14">
       <p:transition spd="med" p14:dur="700">
         <p:fade/>
       </p:transition>
     </mc:Choice>
-    <mc:Fallback>
+    <mc:Fallback xmlns="">
       <p:transition spd="med">
         <p:fade/>
       </p:transition>
@@ -18293,13 +18301,13 @@
   <p:clrMapOvr>
     <a:masterClrMapping/>
   </p:clrMapOvr>
-  <mc:AlternateContent xmlns:mc="http://schemas.openxmlformats.org/markup-compatibility/2006">
-    <mc:Choice xmlns:p14="http://schemas.microsoft.com/office/powerpoint/2010/main" Requires="p14">
+  <mc:AlternateContent xmlns:mc="http://schemas.openxmlformats.org/markup-compatibility/2006" xmlns:p14="http://schemas.microsoft.com/office/powerpoint/2010/main">
+    <mc:Choice Requires="p14">
       <p:transition spd="med" p14:dur="700">
         <p:fade/>
       </p:transition>
     </mc:Choice>
-    <mc:Fallback>
+    <mc:Fallback xmlns="">
       <p:transition spd="med">
         <p:fade/>
       </p:transition>
@@ -18828,13 +18836,13 @@
   <p:clrMapOvr>
     <a:masterClrMapping/>
   </p:clrMapOvr>
-  <mc:AlternateContent xmlns:mc="http://schemas.openxmlformats.org/markup-compatibility/2006">
-    <mc:Choice xmlns:p14="http://schemas.microsoft.com/office/powerpoint/2010/main" Requires="p14">
+  <mc:AlternateContent xmlns:mc="http://schemas.openxmlformats.org/markup-compatibility/2006" xmlns:p14="http://schemas.microsoft.com/office/powerpoint/2010/main">
+    <mc:Choice Requires="p14">
       <p:transition spd="med" p14:dur="700">
         <p:fade/>
       </p:transition>
     </mc:Choice>
-    <mc:Fallback>
+    <mc:Fallback xmlns="">
       <p:transition spd="med">
         <p:fade/>
       </p:transition>
@@ -19693,13 +19701,13 @@
   <p:clrMapOvr>
     <a:masterClrMapping/>
   </p:clrMapOvr>
-  <mc:AlternateContent xmlns:mc="http://schemas.openxmlformats.org/markup-compatibility/2006">
-    <mc:Choice xmlns:p14="http://schemas.microsoft.com/office/powerpoint/2010/main" Requires="p14">
+  <mc:AlternateContent xmlns:mc="http://schemas.openxmlformats.org/markup-compatibility/2006" xmlns:p14="http://schemas.microsoft.com/office/powerpoint/2010/main">
+    <mc:Choice Requires="p14">
       <p:transition spd="med" p14:dur="700">
         <p:fade/>
       </p:transition>
     </mc:Choice>
-    <mc:Fallback>
+    <mc:Fallback xmlns="">
       <p:transition spd="med">
         <p:fade/>
       </p:transition>
@@ -20771,13 +20779,13 @@
   <p:clrMapOvr>
     <a:masterClrMapping/>
   </p:clrMapOvr>
-  <mc:AlternateContent xmlns:mc="http://schemas.openxmlformats.org/markup-compatibility/2006">
-    <mc:Choice xmlns:p14="http://schemas.microsoft.com/office/powerpoint/2010/main" Requires="p14">
+  <mc:AlternateContent xmlns:mc="http://schemas.openxmlformats.org/markup-compatibility/2006" xmlns:p14="http://schemas.microsoft.com/office/powerpoint/2010/main">
+    <mc:Choice Requires="p14">
       <p:transition spd="med" p14:dur="700">
         <p:fade/>
       </p:transition>
     </mc:Choice>
-    <mc:Fallback>
+    <mc:Fallback xmlns="">
       <p:transition spd="med">
         <p:fade/>
       </p:transition>
@@ -21208,13 +21216,13 @@
   <p:clrMapOvr>
     <a:masterClrMapping/>
   </p:clrMapOvr>
-  <mc:AlternateContent xmlns:mc="http://schemas.openxmlformats.org/markup-compatibility/2006">
-    <mc:Choice xmlns:p14="http://schemas.microsoft.com/office/powerpoint/2010/main" Requires="p14">
+  <mc:AlternateContent xmlns:mc="http://schemas.openxmlformats.org/markup-compatibility/2006" xmlns:p14="http://schemas.microsoft.com/office/powerpoint/2010/main">
+    <mc:Choice Requires="p14">
       <p:transition spd="med" p14:dur="700">
         <p:fade/>
       </p:transition>
     </mc:Choice>
-    <mc:Fallback>
+    <mc:Fallback xmlns="">
       <p:transition spd="med">
         <p:fade/>
       </p:transition>
@@ -21315,8 +21323,13 @@
           <a:p>
             <a:r>
               <a:rPr lang="en-GB" dirty="0"/>
-              <a:t>Avoid Parameters.xml</a:t>
-            </a:r>
+              <a:t>Avoid </a:t>
+            </a:r>
+            <a:r>
+              <a:rPr lang="en-GB" dirty="0" err="1"/>
+              <a:t>Parameters.json</a:t>
+            </a:r>
+            <a:endParaRPr lang="en-GB" dirty="0"/>
           </a:p>
           <a:p>
             <a:r>
@@ -21350,13 +21363,13 @@
   <p:clrMapOvr>
     <a:masterClrMapping/>
   </p:clrMapOvr>
-  <mc:AlternateContent xmlns:mc="http://schemas.openxmlformats.org/markup-compatibility/2006">
-    <mc:Choice xmlns:p14="http://schemas.microsoft.com/office/powerpoint/2010/main" Requires="p14">
+  <mc:AlternateContent xmlns:mc="http://schemas.openxmlformats.org/markup-compatibility/2006" xmlns:p14="http://schemas.microsoft.com/office/powerpoint/2010/main">
+    <mc:Choice Requires="p14">
       <p:transition spd="med" p14:dur="700">
         <p:fade/>
       </p:transition>
     </mc:Choice>
-    <mc:Fallback>
+    <mc:Fallback xmlns="">
       <p:transition spd="med">
         <p:fade/>
       </p:transition>
@@ -21905,29 +21918,6 @@
 </file>
 
 <file path=customXml/item1.xml><?xml version="1.0" encoding="utf-8"?>
-<p:properties xmlns:p="http://schemas.microsoft.com/office/2006/metadata/properties" xmlns:xsi="http://www.w3.org/2001/XMLSchema-instance" xmlns:pc="http://schemas.microsoft.com/office/infopath/2007/PartnerControls">
-  <documentManagement>
-    <Presentation_x0020_Type xmlns="2e3a2f0e-52a2-4d17-81ea-e86137565b82">Black Marble</Presentation_x0020_Type>
-    <Event_x0020_Location xmlns="2e3a2f0e-52a2-4d17-81ea-e86137565b82" xsi:nil="true"/>
-    <Event_x0020_Date xmlns="2e3a2f0e-52a2-4d17-81ea-e86137565b82" xsi:nil="true"/>
-    <Product xmlns="2e3a2f0e-52a2-4d17-81ea-e86137565b82">
-      <Value>Visual Studio</Value>
-    </Product>
-    <Market xmlns="2e3a2f0e-52a2-4d17-81ea-e86137565b82">General</Market>
-  </documentManagement>
-</p:properties>
-</file>
-
-<file path=customXml/item2.xml><?xml version="1.0" encoding="utf-8"?>
-<?mso-contentType ?>
-<FormTemplates xmlns="http://schemas.microsoft.com/sharepoint/v3/contenttype/forms">
-  <Display>DocumentLibraryForm</Display>
-  <Edit>DocumentLibraryForm</Edit>
-  <New>DocumentLibraryForm</New>
-</FormTemplates>
-</file>
-
-<file path=customXml/item3.xml><?xml version="1.0" encoding="utf-8"?>
 <ct:contentTypeSchema xmlns:ct="http://schemas.microsoft.com/office/2006/metadata/contentType" xmlns:ma="http://schemas.microsoft.com/office/2006/metadata/properties/metaAttributes" ct:_="" ma:_="" ma:contentTypeName="Document" ma:contentTypeID="0x010100DCAAFC307EF60A41BA7D1D0325CDC603" ma:contentTypeVersion="5" ma:contentTypeDescription="Create a new document." ma:contentTypeScope="" ma:versionID="7db0e9209c5ef04358c79c8eed35302e">
   <xsd:schema xmlns:xsd="http://www.w3.org/2001/XMLSchema" xmlns:xs="http://www.w3.org/2001/XMLSchema" xmlns:p="http://schemas.microsoft.com/office/2006/metadata/properties" xmlns:ns2="2e3a2f0e-52a2-4d17-81ea-e86137565b82" targetNamespace="http://schemas.microsoft.com/office/2006/metadata/properties" ma:root="true" ma:fieldsID="ccea1741cfef7283adcc88c53f48b902" ns2:_="">
     <xsd:import namespace="2e3a2f0e-52a2-4d17-81ea-e86137565b82"/>
@@ -22127,31 +22117,30 @@
 </ct:contentTypeSchema>
 </file>
 
-<file path=customXml/itemProps1.xml><?xml version="1.0" encoding="utf-8"?>
-<ds:datastoreItem xmlns:ds="http://schemas.openxmlformats.org/officeDocument/2006/customXml" ds:itemID="{76E5C231-F84E-40AB-853E-A10ACDAA9762}">
-  <ds:schemaRefs>
-    <ds:schemaRef ds:uri="http://www.w3.org/XML/1998/namespace"/>
-    <ds:schemaRef ds:uri="http://purl.org/dc/elements/1.1/"/>
-    <ds:schemaRef ds:uri="http://purl.org/dc/dcmitype/"/>
-    <ds:schemaRef ds:uri="http://purl.org/dc/terms/"/>
-    <ds:schemaRef ds:uri="http://schemas.microsoft.com/office/2006/documentManagement/types"/>
-    <ds:schemaRef ds:uri="2e3a2f0e-52a2-4d17-81ea-e86137565b82"/>
-    <ds:schemaRef ds:uri="http://schemas.microsoft.com/office/infopath/2007/PartnerControls"/>
-    <ds:schemaRef ds:uri="http://schemas.openxmlformats.org/package/2006/metadata/core-properties"/>
-    <ds:schemaRef ds:uri="http://schemas.microsoft.com/office/2006/metadata/properties"/>
-  </ds:schemaRefs>
-</ds:datastoreItem>
+<file path=customXml/item2.xml><?xml version="1.0" encoding="utf-8"?>
+<?mso-contentType ?>
+<FormTemplates xmlns="http://schemas.microsoft.com/sharepoint/v3/contenttype/forms">
+  <Display>DocumentLibraryForm</Display>
+  <Edit>DocumentLibraryForm</Edit>
+  <New>DocumentLibraryForm</New>
+</FormTemplates>
 </file>
 
-<file path=customXml/itemProps2.xml><?xml version="1.0" encoding="utf-8"?>
-<ds:datastoreItem xmlns:ds="http://schemas.openxmlformats.org/officeDocument/2006/customXml" ds:itemID="{25D0ABE3-E1E0-4685-B629-89459358F919}">
-  <ds:schemaRefs>
-    <ds:schemaRef ds:uri="http://schemas.microsoft.com/sharepoint/v3/contenttype/forms"/>
-  </ds:schemaRefs>
-</ds:datastoreItem>
+<file path=customXml/item3.xml><?xml version="1.0" encoding="utf-8"?>
+<p:properties xmlns:p="http://schemas.microsoft.com/office/2006/metadata/properties" xmlns:xsi="http://www.w3.org/2001/XMLSchema-instance" xmlns:pc="http://schemas.microsoft.com/office/infopath/2007/PartnerControls">
+  <documentManagement>
+    <Presentation_x0020_Type xmlns="2e3a2f0e-52a2-4d17-81ea-e86137565b82">Black Marble</Presentation_x0020_Type>
+    <Event_x0020_Location xmlns="2e3a2f0e-52a2-4d17-81ea-e86137565b82" xsi:nil="true"/>
+    <Event_x0020_Date xmlns="2e3a2f0e-52a2-4d17-81ea-e86137565b82" xsi:nil="true"/>
+    <Product xmlns="2e3a2f0e-52a2-4d17-81ea-e86137565b82">
+      <Value>Visual Studio</Value>
+    </Product>
+    <Market xmlns="2e3a2f0e-52a2-4d17-81ea-e86137565b82">General</Market>
+  </documentManagement>
+</p:properties>
 </file>
 
-<file path=customXml/itemProps3.xml><?xml version="1.0" encoding="utf-8"?>
+<file path=customXml/itemProps1.xml><?xml version="1.0" encoding="utf-8"?>
 <ds:datastoreItem xmlns:ds="http://schemas.openxmlformats.org/officeDocument/2006/customXml" ds:itemID="{592E4D04-EAB7-4111-818B-6799853C673A}">
   <ds:schemaRefs>
     <ds:schemaRef ds:uri="http://schemas.microsoft.com/office/2006/metadata/contentType"/>
@@ -22167,4 +22156,28 @@
     <ds:schemaRef ds:uri="http://schemas.microsoft.com/internal/obd"/>
   </ds:schemaRefs>
 </ds:datastoreItem>
+</file>
+
+<file path=customXml/itemProps2.xml><?xml version="1.0" encoding="utf-8"?>
+<ds:datastoreItem xmlns:ds="http://schemas.openxmlformats.org/officeDocument/2006/customXml" ds:itemID="{25D0ABE3-E1E0-4685-B629-89459358F919}">
+  <ds:schemaRefs>
+    <ds:schemaRef ds:uri="http://schemas.microsoft.com/sharepoint/v3/contenttype/forms"/>
+  </ds:schemaRefs>
+</ds:datastoreItem>
+</file>
+
+<file path=customXml/itemProps3.xml><?xml version="1.0" encoding="utf-8"?>
+<ds:datastoreItem xmlns:ds="http://schemas.openxmlformats.org/officeDocument/2006/customXml" ds:itemID="{76E5C231-F84E-40AB-853E-A10ACDAA9762}">
+  <ds:schemaRefs>
+    <ds:schemaRef ds:uri="http://www.w3.org/XML/1998/namespace"/>
+    <ds:schemaRef ds:uri="http://purl.org/dc/elements/1.1/"/>
+    <ds:schemaRef ds:uri="http://purl.org/dc/dcmitype/"/>
+    <ds:schemaRef ds:uri="http://purl.org/dc/terms/"/>
+    <ds:schemaRef ds:uri="http://schemas.microsoft.com/office/2006/documentManagement/types"/>
+    <ds:schemaRef ds:uri="2e3a2f0e-52a2-4d17-81ea-e86137565b82"/>
+    <ds:schemaRef ds:uri="http://schemas.microsoft.com/office/infopath/2007/PartnerControls"/>
+    <ds:schemaRef ds:uri="http://schemas.openxmlformats.org/package/2006/metadata/core-properties"/>
+    <ds:schemaRef ds:uri="http://schemas.microsoft.com/office/2006/metadata/properties"/>
+  </ds:schemaRefs>
+</ds:datastoreItem>
 </file>
</xml_diff>